<commit_message>
adding checkpoint version for presentation
</commit_message>
<xml_diff>
--- a/Craft_Breweries_Analysis.pptx
+++ b/Craft_Breweries_Analysis.pptx
@@ -5,15 +5,17 @@
     <p:sldMasterId id="2147483660" r:id="rId1"/>
   </p:sldMasterIdLst>
   <p:notesMasterIdLst>
-    <p:notesMasterId r:id="rId8"/>
+    <p:notesMasterId r:id="rId10"/>
   </p:notesMasterIdLst>
   <p:sldIdLst>
     <p:sldId id="256" r:id="rId2"/>
     <p:sldId id="264" r:id="rId3"/>
     <p:sldId id="265" r:id="rId4"/>
     <p:sldId id="257" r:id="rId5"/>
-    <p:sldId id="260" r:id="rId6"/>
-    <p:sldId id="262" r:id="rId7"/>
+    <p:sldId id="266" r:id="rId6"/>
+    <p:sldId id="267" r:id="rId7"/>
+    <p:sldId id="260" r:id="rId8"/>
+    <p:sldId id="262" r:id="rId9"/>
   </p:sldIdLst>
   <p:sldSz cx="9144000" cy="6858000" type="screen4x3"/>
   <p:notesSz cx="6858000" cy="9144000"/>
@@ -112,6 +114,11 @@
       </a:defRPr>
     </a:lvl9pPr>
   </p:defaultTextStyle>
+  <p:extLst>
+    <p:ext uri="{EFAFB233-063F-42B5-8137-9DF3F51BA10A}">
+      <p15:sldGuideLst xmlns:p15="http://schemas.microsoft.com/office/powerpoint/2012/main"/>
+    </p:ext>
+  </p:extLst>
 </p:presentation>
 </file>
 
@@ -197,7 +204,7 @@
           <a:p>
             <a:fld id="{6BE62747-4D0F-4B17-92E5-7E2584404AEF}" type="datetimeFigureOut">
               <a:rPr lang="en-CA" smtClean="0"/>
-              <a:t>2023-12-25</a:t>
+              <a:t>2024-01-02</a:t>
             </a:fld>
             <a:endParaRPr lang="en-CA"/>
           </a:p>
@@ -510,11 +517,27 @@
           <a:lstStyle/>
           <a:p>
             <a:r>
-              <a:rPr lang="en-CA" dirty="0"/>
-              <a:t>https://globalnews.ca/news/10156194/rising-costs-bc-craft-breweries/</a:t>
-            </a:r>
-          </a:p>
-          <a:p>
+              <a:rPr lang="en-US" dirty="0"/>
+              <a:t>In many countries across the globe, small businesses act as a backbone of the economy, providing jobs, goods, and services. In order to open a small business, a careful research into potential product and market characteristics needs to be performed, to ensure the endeavor is successful.</a:t>
+            </a:r>
+          </a:p>
+          <a:p>
+            <a:endParaRPr lang="en-US" dirty="0"/>
+          </a:p>
+          <a:p>
+            <a:r>
+              <a:rPr lang="en-US" dirty="0"/>
+              <a:t>Micro-, small and medium-sized enterprises (commonly abbreviated as SMEs) are responsible for more than two thirds of all jobs worldwide. SMEs also account for the majority of new job creation. Small businesses focus on customer experience, stimulate local economy, often have lower  environmental impact (through shorter transportation distances), create jobs, and facilitate local community building (through paying local and state taxes and engaging in local charities and nonprofits).</a:t>
+            </a:r>
+          </a:p>
+          <a:p>
+            <a:endParaRPr lang="en-US" dirty="0"/>
+          </a:p>
+          <a:p>
+            <a:r>
+              <a:rPr lang="en-US" dirty="0"/>
+              <a:t>Craft beer industry has gained popularity globally in recent years and is continuing to expand. It is a localized industry, which needs to be analyzed on a location-by-location basis due to its niche nature.</a:t>
+            </a:r>
             <a:endParaRPr lang="en-CA" dirty="0"/>
           </a:p>
         </p:txBody>
@@ -729,6 +752,174 @@
     <p:extLst>
       <p:ext uri="{BB962C8B-B14F-4D97-AF65-F5344CB8AC3E}">
         <p14:creationId xmlns:p14="http://schemas.microsoft.com/office/powerpoint/2010/main" val="4252738330"/>
+      </p:ext>
+    </p:extLst>
+  </p:cSld>
+  <p:clrMapOvr>
+    <a:masterClrMapping/>
+  </p:clrMapOvr>
+</p:notes>
+</file>
+
+<file path=ppt/notesSlides/notesSlide4.xml><?xml version="1.0" encoding="utf-8"?>
+<p:notes xmlns:a="http://schemas.openxmlformats.org/drawingml/2006/main" xmlns:r="http://schemas.openxmlformats.org/officeDocument/2006/relationships" xmlns:p="http://schemas.openxmlformats.org/presentationml/2006/main">
+  <p:cSld>
+    <p:spTree>
+      <p:nvGrpSpPr>
+        <p:cNvPr id="1" name=""/>
+        <p:cNvGrpSpPr/>
+        <p:nvPr/>
+      </p:nvGrpSpPr>
+      <p:grpSpPr>
+        <a:xfrm>
+          <a:off x="0" y="0"/>
+          <a:ext cx="0" cy="0"/>
+          <a:chOff x="0" y="0"/>
+          <a:chExt cx="0" cy="0"/>
+        </a:xfrm>
+      </p:grpSpPr>
+      <p:sp>
+        <p:nvSpPr>
+          <p:cNvPr id="2" name="Slide Image Placeholder 1"/>
+          <p:cNvSpPr>
+            <a:spLocks noGrp="1" noRot="1" noChangeAspect="1"/>
+          </p:cNvSpPr>
+          <p:nvPr>
+            <p:ph type="sldImg"/>
+          </p:nvPr>
+        </p:nvSpPr>
+        <p:spPr/>
+      </p:sp>
+      <p:sp>
+        <p:nvSpPr>
+          <p:cNvPr id="3" name="Notes Placeholder 2"/>
+          <p:cNvSpPr>
+            <a:spLocks noGrp="1"/>
+          </p:cNvSpPr>
+          <p:nvPr>
+            <p:ph type="body" idx="1"/>
+          </p:nvPr>
+        </p:nvSpPr>
+        <p:spPr/>
+        <p:txBody>
+          <a:bodyPr/>
+          <a:lstStyle/>
+          <a:p>
+            <a:endParaRPr lang="en-CA" dirty="0"/>
+          </a:p>
+        </p:txBody>
+      </p:sp>
+      <p:sp>
+        <p:nvSpPr>
+          <p:cNvPr id="4" name="Slide Number Placeholder 3"/>
+          <p:cNvSpPr>
+            <a:spLocks noGrp="1"/>
+          </p:cNvSpPr>
+          <p:nvPr>
+            <p:ph type="sldNum" sz="quarter" idx="5"/>
+          </p:nvPr>
+        </p:nvSpPr>
+        <p:spPr/>
+        <p:txBody>
+          <a:bodyPr/>
+          <a:lstStyle/>
+          <a:p>
+            <a:fld id="{F2E2264C-D68A-4D70-A4E3-CAF58395AF64}" type="slidenum">
+              <a:rPr lang="en-CA" smtClean="0"/>
+              <a:t>5</a:t>
+            </a:fld>
+            <a:endParaRPr lang="en-CA"/>
+          </a:p>
+        </p:txBody>
+      </p:sp>
+    </p:spTree>
+    <p:extLst>
+      <p:ext uri="{BB962C8B-B14F-4D97-AF65-F5344CB8AC3E}">
+        <p14:creationId xmlns:p14="http://schemas.microsoft.com/office/powerpoint/2010/main" val="2033519865"/>
+      </p:ext>
+    </p:extLst>
+  </p:cSld>
+  <p:clrMapOvr>
+    <a:masterClrMapping/>
+  </p:clrMapOvr>
+</p:notes>
+</file>
+
+<file path=ppt/notesSlides/notesSlide5.xml><?xml version="1.0" encoding="utf-8"?>
+<p:notes xmlns:a="http://schemas.openxmlformats.org/drawingml/2006/main" xmlns:r="http://schemas.openxmlformats.org/officeDocument/2006/relationships" xmlns:p="http://schemas.openxmlformats.org/presentationml/2006/main">
+  <p:cSld>
+    <p:spTree>
+      <p:nvGrpSpPr>
+        <p:cNvPr id="1" name=""/>
+        <p:cNvGrpSpPr/>
+        <p:nvPr/>
+      </p:nvGrpSpPr>
+      <p:grpSpPr>
+        <a:xfrm>
+          <a:off x="0" y="0"/>
+          <a:ext cx="0" cy="0"/>
+          <a:chOff x="0" y="0"/>
+          <a:chExt cx="0" cy="0"/>
+        </a:xfrm>
+      </p:grpSpPr>
+      <p:sp>
+        <p:nvSpPr>
+          <p:cNvPr id="2" name="Slide Image Placeholder 1"/>
+          <p:cNvSpPr>
+            <a:spLocks noGrp="1" noRot="1" noChangeAspect="1"/>
+          </p:cNvSpPr>
+          <p:nvPr>
+            <p:ph type="sldImg"/>
+          </p:nvPr>
+        </p:nvSpPr>
+        <p:spPr/>
+      </p:sp>
+      <p:sp>
+        <p:nvSpPr>
+          <p:cNvPr id="3" name="Notes Placeholder 2"/>
+          <p:cNvSpPr>
+            <a:spLocks noGrp="1"/>
+          </p:cNvSpPr>
+          <p:nvPr>
+            <p:ph type="body" idx="1"/>
+          </p:nvPr>
+        </p:nvSpPr>
+        <p:spPr/>
+        <p:txBody>
+          <a:bodyPr/>
+          <a:lstStyle/>
+          <a:p>
+            <a:endParaRPr lang="en-CA" dirty="0"/>
+          </a:p>
+        </p:txBody>
+      </p:sp>
+      <p:sp>
+        <p:nvSpPr>
+          <p:cNvPr id="4" name="Slide Number Placeholder 3"/>
+          <p:cNvSpPr>
+            <a:spLocks noGrp="1"/>
+          </p:cNvSpPr>
+          <p:nvPr>
+            <p:ph type="sldNum" sz="quarter" idx="5"/>
+          </p:nvPr>
+        </p:nvSpPr>
+        <p:spPr/>
+        <p:txBody>
+          <a:bodyPr/>
+          <a:lstStyle/>
+          <a:p>
+            <a:fld id="{F2E2264C-D68A-4D70-A4E3-CAF58395AF64}" type="slidenum">
+              <a:rPr lang="en-CA" smtClean="0"/>
+              <a:t>6</a:t>
+            </a:fld>
+            <a:endParaRPr lang="en-CA"/>
+          </a:p>
+        </p:txBody>
+      </p:sp>
+    </p:spTree>
+    <p:extLst>
+      <p:ext uri="{BB962C8B-B14F-4D97-AF65-F5344CB8AC3E}">
+        <p14:creationId xmlns:p14="http://schemas.microsoft.com/office/powerpoint/2010/main" val="2002770022"/>
       </p:ext>
     </p:extLst>
   </p:cSld>
@@ -869,7 +1060,7 @@
           <a:p>
             <a:fld id="{3C2FC75C-55CA-499A-9BA3-4655D81C8D8D}" type="datetime1">
               <a:rPr lang="en-CA" smtClean="0"/>
-              <a:t>2023-12-25</a:t>
+              <a:t>2024-01-02</a:t>
             </a:fld>
             <a:endParaRPr lang="en-CA"/>
           </a:p>
@@ -1039,7 +1230,7 @@
           <a:p>
             <a:fld id="{2E059ABB-81FB-42B5-AC9C-20E34787D205}" type="datetime1">
               <a:rPr lang="en-CA" smtClean="0"/>
-              <a:t>2023-12-25</a:t>
+              <a:t>2024-01-02</a:t>
             </a:fld>
             <a:endParaRPr lang="en-CA"/>
           </a:p>
@@ -1219,7 +1410,7 @@
           <a:p>
             <a:fld id="{2994E6F9-F42E-48FF-B2AD-3545464D5263}" type="datetime1">
               <a:rPr lang="en-CA" smtClean="0"/>
-              <a:t>2023-12-25</a:t>
+              <a:t>2024-01-02</a:t>
             </a:fld>
             <a:endParaRPr lang="en-CA"/>
           </a:p>
@@ -1389,7 +1580,7 @@
           <a:p>
             <a:fld id="{41CD1680-7F5D-46E5-9307-0E601DE95AE9}" type="datetime1">
               <a:rPr lang="en-CA" smtClean="0"/>
-              <a:t>2023-12-25</a:t>
+              <a:t>2024-01-02</a:t>
             </a:fld>
             <a:endParaRPr lang="en-CA"/>
           </a:p>
@@ -1633,7 +1824,7 @@
           <a:p>
             <a:fld id="{41B075F3-C950-4686-AB38-03B64A02A3E1}" type="datetime1">
               <a:rPr lang="en-CA" smtClean="0"/>
-              <a:t>2023-12-25</a:t>
+              <a:t>2024-01-02</a:t>
             </a:fld>
             <a:endParaRPr lang="en-CA"/>
           </a:p>
@@ -1865,7 +2056,7 @@
           <a:p>
             <a:fld id="{C67B40E6-3443-43EC-88C4-6FC839EAB18C}" type="datetime1">
               <a:rPr lang="en-CA" smtClean="0"/>
-              <a:t>2023-12-25</a:t>
+              <a:t>2024-01-02</a:t>
             </a:fld>
             <a:endParaRPr lang="en-CA"/>
           </a:p>
@@ -2232,7 +2423,7 @@
           <a:p>
             <a:fld id="{AB95B4C5-B67F-4730-89B4-FD642C03C7F8}" type="datetime1">
               <a:rPr lang="en-CA" smtClean="0"/>
-              <a:t>2023-12-25</a:t>
+              <a:t>2024-01-02</a:t>
             </a:fld>
             <a:endParaRPr lang="en-CA"/>
           </a:p>
@@ -2350,7 +2541,7 @@
           <a:p>
             <a:fld id="{585D3F1B-02B4-44A2-984F-E8D38EE19E0E}" type="datetime1">
               <a:rPr lang="en-CA" smtClean="0"/>
-              <a:t>2023-12-25</a:t>
+              <a:t>2024-01-02</a:t>
             </a:fld>
             <a:endParaRPr lang="en-CA"/>
           </a:p>
@@ -2445,7 +2636,7 @@
           <a:p>
             <a:fld id="{3A5277F2-0931-4BEB-9F21-3310E861E9FE}" type="datetime1">
               <a:rPr lang="en-CA" smtClean="0"/>
-              <a:t>2023-12-25</a:t>
+              <a:t>2024-01-02</a:t>
             </a:fld>
             <a:endParaRPr lang="en-CA"/>
           </a:p>
@@ -2722,7 +2913,7 @@
           <a:p>
             <a:fld id="{225C0977-56A7-43EC-8584-152DFF276DA5}" type="datetime1">
               <a:rPr lang="en-CA" smtClean="0"/>
-              <a:t>2023-12-25</a:t>
+              <a:t>2024-01-02</a:t>
             </a:fld>
             <a:endParaRPr lang="en-CA"/>
           </a:p>
@@ -2979,7 +3170,7 @@
           <a:p>
             <a:fld id="{AFB534C3-8B90-4C2C-9202-DBE83FB87C91}" type="datetime1">
               <a:rPr lang="en-CA" smtClean="0"/>
-              <a:t>2023-12-25</a:t>
+              <a:t>2024-01-02</a:t>
             </a:fld>
             <a:endParaRPr lang="en-CA"/>
           </a:p>
@@ -3192,7 +3383,7 @@
           <a:p>
             <a:fld id="{9DD4DB05-6087-4ABE-9A3B-8C33DF2E3692}" type="datetime1">
               <a:rPr lang="en-CA" smtClean="0"/>
-              <a:t>2023-12-25</a:t>
+              <a:t>2024-01-02</a:t>
             </a:fld>
             <a:endParaRPr lang="en-CA"/>
           </a:p>
@@ -6008,7 +6199,7 @@
                   <a:schemeClr val="bg1"/>
                 </a:solidFill>
               </a:rPr>
-              <a:t>Most Numerical Data Is Uniformly Distributed</a:t>
+              <a:t>Most Numerical Data Is Uniformly Distributed (Sample)</a:t>
             </a:r>
           </a:p>
         </p:txBody>
@@ -6275,10 +6466,10 @@
       </p:grpSpPr>
       <p:pic>
         <p:nvPicPr>
-          <p:cNvPr id="8" name="Picture 7">
+          <p:cNvPr id="4" name="Picture 3">
             <a:extLst>
               <a:ext uri="{FF2B5EF4-FFF2-40B4-BE49-F238E27FC236}">
-                <a16:creationId xmlns:a16="http://schemas.microsoft.com/office/drawing/2014/main" id="{A2993B62-66B1-9512-BA99-55E691565532}"/>
+                <a16:creationId xmlns:a16="http://schemas.microsoft.com/office/drawing/2014/main" id="{2805F358-1C55-6B94-79CB-E09FA6545AD9}"/>
               </a:ext>
             </a:extLst>
           </p:cNvPr>
@@ -6288,15 +6479,15 @@
           <p:nvPr/>
         </p:nvPicPr>
         <p:blipFill>
-          <a:blip r:embed="rId2"/>
+          <a:blip r:embed="rId3"/>
           <a:stretch>
             <a:fillRect/>
           </a:stretch>
         </p:blipFill>
         <p:spPr>
           <a:xfrm>
-            <a:off x="3337471" y="1333807"/>
-            <a:ext cx="5713236" cy="5524193"/>
+            <a:off x="66336" y="1637836"/>
+            <a:ext cx="9001493" cy="4687356"/>
           </a:xfrm>
           <a:prstGeom prst="rect">
             <a:avLst/>
@@ -6317,7 +6508,367 @@
         </p:nvGrpSpPr>
         <p:grpSpPr>
           <a:xfrm>
-            <a:off x="-52388" y="-42546"/>
+            <a:off x="0" y="-9525"/>
+            <a:ext cx="9144004" cy="1345501"/>
+            <a:chOff x="0" y="-9525"/>
+            <a:chExt cx="9144004" cy="1345501"/>
+          </a:xfrm>
+        </p:grpSpPr>
+        <p:pic>
+          <p:nvPicPr>
+            <p:cNvPr id="5" name="Picture 4" descr="A group of glasses of beer next to a barrel&#10;&#10;Description automatically generated">
+              <a:extLst>
+                <a:ext uri="{FF2B5EF4-FFF2-40B4-BE49-F238E27FC236}">
+                  <a16:creationId xmlns:a16="http://schemas.microsoft.com/office/drawing/2014/main" id="{5FCCBEF3-084E-30BD-69A6-66F4082760DF}"/>
+                </a:ext>
+              </a:extLst>
+            </p:cNvPr>
+            <p:cNvPicPr>
+              <a:picLocks noChangeAspect="1"/>
+            </p:cNvPicPr>
+            <p:nvPr/>
+          </p:nvPicPr>
+          <p:blipFill rotWithShape="1">
+            <a:blip r:embed="rId4">
+              <a:extLst>
+                <a:ext uri="{28A0092B-C50C-407E-A947-70E740481C1C}">
+                  <a14:useLocalDpi xmlns:a14="http://schemas.microsoft.com/office/drawing/2010/main" val="0"/>
+                </a:ext>
+              </a:extLst>
+            </a:blip>
+            <a:srcRect l="86905" t="-1" r="-1" b="33333"/>
+            <a:stretch/>
+          </p:blipFill>
+          <p:spPr>
+            <a:xfrm rot="16200000">
+              <a:off x="1613250" y="-1622775"/>
+              <a:ext cx="1345501" cy="4572002"/>
+            </a:xfrm>
+            <a:prstGeom prst="rect">
+              <a:avLst/>
+            </a:prstGeom>
+          </p:spPr>
+        </p:pic>
+        <p:pic>
+          <p:nvPicPr>
+            <p:cNvPr id="6" name="Picture 5" descr="A group of glasses of beer next to a barrel&#10;&#10;Description automatically generated">
+              <a:extLst>
+                <a:ext uri="{FF2B5EF4-FFF2-40B4-BE49-F238E27FC236}">
+                  <a16:creationId xmlns:a16="http://schemas.microsoft.com/office/drawing/2014/main" id="{A235DD66-457F-CB85-4B74-7118A0FC8CED}"/>
+                </a:ext>
+              </a:extLst>
+            </p:cNvPr>
+            <p:cNvPicPr>
+              <a:picLocks noChangeAspect="1"/>
+            </p:cNvPicPr>
+            <p:nvPr/>
+          </p:nvPicPr>
+          <p:blipFill rotWithShape="1">
+            <a:blip r:embed="rId4">
+              <a:extLst>
+                <a:ext uri="{28A0092B-C50C-407E-A947-70E740481C1C}">
+                  <a14:useLocalDpi xmlns:a14="http://schemas.microsoft.com/office/drawing/2010/main" val="0"/>
+                </a:ext>
+              </a:extLst>
+            </a:blip>
+            <a:srcRect l="86905" t="-1" r="-1" b="33333"/>
+            <a:stretch/>
+          </p:blipFill>
+          <p:spPr>
+            <a:xfrm rot="16200000">
+              <a:off x="6185252" y="-1622775"/>
+              <a:ext cx="1345501" cy="4572002"/>
+            </a:xfrm>
+            <a:prstGeom prst="rect">
+              <a:avLst/>
+            </a:prstGeom>
+          </p:spPr>
+        </p:pic>
+      </p:grpSp>
+      <p:sp>
+        <p:nvSpPr>
+          <p:cNvPr id="2" name="Title 1">
+            <a:extLst>
+              <a:ext uri="{FF2B5EF4-FFF2-40B4-BE49-F238E27FC236}">
+                <a16:creationId xmlns:a16="http://schemas.microsoft.com/office/drawing/2014/main" id="{13EBFBAB-7D21-FC7F-0D14-3DF13D7305AF}"/>
+              </a:ext>
+            </a:extLst>
+          </p:cNvPr>
+          <p:cNvSpPr>
+            <a:spLocks noGrp="1"/>
+          </p:cNvSpPr>
+          <p:nvPr>
+            <p:ph type="title"/>
+          </p:nvPr>
+        </p:nvSpPr>
+        <p:spPr>
+          <a:xfrm>
+            <a:off x="628650" y="360364"/>
+            <a:ext cx="7886700" cy="754062"/>
+          </a:xfrm>
+        </p:spPr>
+        <p:txBody>
+          <a:bodyPr>
+            <a:normAutofit fontScale="90000"/>
+          </a:bodyPr>
+          <a:lstStyle/>
+          <a:p>
+            <a:r>
+              <a:rPr lang="en-CA" sz="3200" dirty="0">
+                <a:solidFill>
+                  <a:schemeClr val="bg1"/>
+                </a:solidFill>
+              </a:rPr>
+              <a:t>Most Numerical Data Is Uniformly Distributed (Population)</a:t>
+            </a:r>
+          </a:p>
+        </p:txBody>
+      </p:sp>
+      <p:sp>
+        <p:nvSpPr>
+          <p:cNvPr id="10" name="Slide Number Placeholder 9">
+            <a:extLst>
+              <a:ext uri="{FF2B5EF4-FFF2-40B4-BE49-F238E27FC236}">
+                <a16:creationId xmlns:a16="http://schemas.microsoft.com/office/drawing/2014/main" id="{F6A7F7CE-8432-E176-6865-B28DEAC284F8}"/>
+              </a:ext>
+            </a:extLst>
+          </p:cNvPr>
+          <p:cNvSpPr>
+            <a:spLocks noGrp="1"/>
+          </p:cNvSpPr>
+          <p:nvPr>
+            <p:ph type="sldNum" sz="quarter" idx="12"/>
+          </p:nvPr>
+        </p:nvSpPr>
+        <p:spPr/>
+        <p:txBody>
+          <a:bodyPr/>
+          <a:lstStyle/>
+          <a:p>
+            <a:fld id="{E32D28F8-53AE-4234-9393-E5F6E52213FC}" type="slidenum">
+              <a:rPr lang="en-CA" smtClean="0"/>
+              <a:t>5</a:t>
+            </a:fld>
+            <a:endParaRPr lang="en-CA"/>
+          </a:p>
+        </p:txBody>
+      </p:sp>
+      <p:sp>
+        <p:nvSpPr>
+          <p:cNvPr id="11" name="Rectangle 10">
+            <a:extLst>
+              <a:ext uri="{FF2B5EF4-FFF2-40B4-BE49-F238E27FC236}">
+                <a16:creationId xmlns:a16="http://schemas.microsoft.com/office/drawing/2014/main" id="{4244E05B-5DE7-9999-F521-0D3B0134B613}"/>
+              </a:ext>
+            </a:extLst>
+          </p:cNvPr>
+          <p:cNvSpPr/>
+          <p:nvPr/>
+        </p:nvSpPr>
+        <p:spPr>
+          <a:xfrm>
+            <a:off x="6838950" y="5172075"/>
+            <a:ext cx="2266950" cy="1184276"/>
+          </a:xfrm>
+          <a:prstGeom prst="rect">
+            <a:avLst/>
+          </a:prstGeom>
+          <a:noFill/>
+          <a:ln w="28575">
+            <a:solidFill>
+              <a:srgbClr val="FF0000"/>
+            </a:solidFill>
+          </a:ln>
+        </p:spPr>
+        <p:style>
+          <a:lnRef idx="2">
+            <a:schemeClr val="accent1">
+              <a:shade val="50000"/>
+            </a:schemeClr>
+          </a:lnRef>
+          <a:fillRef idx="1">
+            <a:schemeClr val="accent1"/>
+          </a:fillRef>
+          <a:effectRef idx="0">
+            <a:schemeClr val="accent1"/>
+          </a:effectRef>
+          <a:fontRef idx="minor">
+            <a:schemeClr val="lt1"/>
+          </a:fontRef>
+        </p:style>
+        <p:txBody>
+          <a:bodyPr rtlCol="0" anchor="ctr"/>
+          <a:lstStyle/>
+          <a:p>
+            <a:pPr algn="ctr"/>
+            <a:endParaRPr lang="en-CA"/>
+          </a:p>
+        </p:txBody>
+      </p:sp>
+      <p:sp>
+        <p:nvSpPr>
+          <p:cNvPr id="12" name="Arrow: Up 11">
+            <a:extLst>
+              <a:ext uri="{FF2B5EF4-FFF2-40B4-BE49-F238E27FC236}">
+                <a16:creationId xmlns:a16="http://schemas.microsoft.com/office/drawing/2014/main" id="{1F5563C7-6BEF-3BF4-1B20-E4110510CDD9}"/>
+              </a:ext>
+            </a:extLst>
+          </p:cNvPr>
+          <p:cNvSpPr/>
+          <p:nvPr/>
+        </p:nvSpPr>
+        <p:spPr>
+          <a:xfrm>
+            <a:off x="6834182" y="6383789"/>
+            <a:ext cx="176213" cy="165786"/>
+          </a:xfrm>
+          <a:prstGeom prst="upArrow">
+            <a:avLst/>
+          </a:prstGeom>
+          <a:solidFill>
+            <a:srgbClr val="FF0000"/>
+          </a:solidFill>
+          <a:ln>
+            <a:solidFill>
+              <a:srgbClr val="FF0000"/>
+            </a:solidFill>
+          </a:ln>
+        </p:spPr>
+        <p:style>
+          <a:lnRef idx="2">
+            <a:schemeClr val="accent1">
+              <a:shade val="50000"/>
+            </a:schemeClr>
+          </a:lnRef>
+          <a:fillRef idx="1">
+            <a:schemeClr val="accent1"/>
+          </a:fillRef>
+          <a:effectRef idx="0">
+            <a:schemeClr val="accent1"/>
+          </a:effectRef>
+          <a:fontRef idx="minor">
+            <a:schemeClr val="lt1"/>
+          </a:fontRef>
+        </p:style>
+        <p:txBody>
+          <a:bodyPr rtlCol="0" anchor="ctr"/>
+          <a:lstStyle/>
+          <a:p>
+            <a:pPr algn="ctr"/>
+            <a:endParaRPr lang="en-CA"/>
+          </a:p>
+        </p:txBody>
+      </p:sp>
+      <p:sp>
+        <p:nvSpPr>
+          <p:cNvPr id="13" name="Rectangle 12">
+            <a:extLst>
+              <a:ext uri="{FF2B5EF4-FFF2-40B4-BE49-F238E27FC236}">
+                <a16:creationId xmlns:a16="http://schemas.microsoft.com/office/drawing/2014/main" id="{4B791C8D-B665-590A-36CB-21B1E9B8D91C}"/>
+              </a:ext>
+            </a:extLst>
+          </p:cNvPr>
+          <p:cNvSpPr/>
+          <p:nvPr/>
+        </p:nvSpPr>
+        <p:spPr>
+          <a:xfrm>
+            <a:off x="4738688" y="6549575"/>
+            <a:ext cx="3376613" cy="307534"/>
+          </a:xfrm>
+          <a:prstGeom prst="rect">
+            <a:avLst/>
+          </a:prstGeom>
+          <a:solidFill>
+            <a:schemeClr val="tx1">
+              <a:lumMod val="75000"/>
+              <a:lumOff val="25000"/>
+            </a:schemeClr>
+          </a:solidFill>
+          <a:ln>
+            <a:solidFill>
+              <a:srgbClr val="FF0000"/>
+            </a:solidFill>
+            <a:prstDash val="sysDash"/>
+          </a:ln>
+        </p:spPr>
+        <p:style>
+          <a:lnRef idx="2">
+            <a:schemeClr val="accent1">
+              <a:shade val="50000"/>
+            </a:schemeClr>
+          </a:lnRef>
+          <a:fillRef idx="1">
+            <a:schemeClr val="accent1"/>
+          </a:fillRef>
+          <a:effectRef idx="0">
+            <a:schemeClr val="accent1"/>
+          </a:effectRef>
+          <a:fontRef idx="minor">
+            <a:schemeClr val="lt1"/>
+          </a:fontRef>
+        </p:style>
+        <p:txBody>
+          <a:bodyPr rtlCol="0" anchor="ctr"/>
+          <a:lstStyle/>
+          <a:p>
+            <a:pPr algn="ctr"/>
+            <a:r>
+              <a:rPr lang="en-CA" dirty="0">
+                <a:solidFill>
+                  <a:schemeClr val="bg1"/>
+                </a:solidFill>
+              </a:rPr>
+              <a:t>Target variable for estimation</a:t>
+            </a:r>
+          </a:p>
+        </p:txBody>
+      </p:sp>
+    </p:spTree>
+    <p:extLst>
+      <p:ext uri="{BB962C8B-B14F-4D97-AF65-F5344CB8AC3E}">
+        <p14:creationId xmlns:p14="http://schemas.microsoft.com/office/powerpoint/2010/main" val="705448255"/>
+      </p:ext>
+    </p:extLst>
+  </p:cSld>
+  <p:clrMapOvr>
+    <a:masterClrMapping/>
+  </p:clrMapOvr>
+</p:sld>
+</file>
+
+<file path=ppt/slides/slide6.xml><?xml version="1.0" encoding="utf-8"?>
+<p:sld xmlns:a="http://schemas.openxmlformats.org/drawingml/2006/main" xmlns:r="http://schemas.openxmlformats.org/officeDocument/2006/relationships" xmlns:p="http://schemas.openxmlformats.org/presentationml/2006/main">
+  <p:cSld>
+    <p:spTree>
+      <p:nvGrpSpPr>
+        <p:cNvPr id="1" name=""/>
+        <p:cNvGrpSpPr/>
+        <p:nvPr/>
+      </p:nvGrpSpPr>
+      <p:grpSpPr>
+        <a:xfrm>
+          <a:off x="0" y="0"/>
+          <a:ext cx="0" cy="0"/>
+          <a:chOff x="0" y="0"/>
+          <a:chExt cx="0" cy="0"/>
+        </a:xfrm>
+      </p:grpSpPr>
+      <p:grpSp>
+        <p:nvGrpSpPr>
+          <p:cNvPr id="7" name="Group 6">
+            <a:extLst>
+              <a:ext uri="{FF2B5EF4-FFF2-40B4-BE49-F238E27FC236}">
+                <a16:creationId xmlns:a16="http://schemas.microsoft.com/office/drawing/2014/main" id="{2C394A6C-0273-16E3-5006-DEF757576BD4}"/>
+              </a:ext>
+            </a:extLst>
+          </p:cNvPr>
+          <p:cNvGrpSpPr/>
+          <p:nvPr/>
+        </p:nvGrpSpPr>
+        <p:grpSpPr>
+          <a:xfrm>
+            <a:off x="0" y="-9525"/>
             <a:ext cx="9144004" cy="1345501"/>
             <a:chOff x="0" y="-9525"/>
             <a:chExt cx="9144004" cy="1345501"/>
@@ -6412,6 +6963,285 @@
         </p:nvSpPr>
         <p:spPr>
           <a:xfrm>
+            <a:off x="628649" y="360364"/>
+            <a:ext cx="8254795" cy="754062"/>
+          </a:xfrm>
+        </p:spPr>
+        <p:txBody>
+          <a:bodyPr>
+            <a:normAutofit/>
+          </a:bodyPr>
+          <a:lstStyle/>
+          <a:p>
+            <a:r>
+              <a:rPr lang="en-CA" sz="3200" dirty="0">
+                <a:solidFill>
+                  <a:schemeClr val="bg1"/>
+                </a:solidFill>
+              </a:rPr>
+              <a:t>Population Mean Grouped by Beer Style</a:t>
+            </a:r>
+          </a:p>
+        </p:txBody>
+      </p:sp>
+      <p:sp>
+        <p:nvSpPr>
+          <p:cNvPr id="10" name="Slide Number Placeholder 9">
+            <a:extLst>
+              <a:ext uri="{FF2B5EF4-FFF2-40B4-BE49-F238E27FC236}">
+                <a16:creationId xmlns:a16="http://schemas.microsoft.com/office/drawing/2014/main" id="{F6A7F7CE-8432-E176-6865-B28DEAC284F8}"/>
+              </a:ext>
+            </a:extLst>
+          </p:cNvPr>
+          <p:cNvSpPr>
+            <a:spLocks noGrp="1"/>
+          </p:cNvSpPr>
+          <p:nvPr>
+            <p:ph type="sldNum" sz="quarter" idx="12"/>
+          </p:nvPr>
+        </p:nvSpPr>
+        <p:spPr/>
+        <p:txBody>
+          <a:bodyPr/>
+          <a:lstStyle/>
+          <a:p>
+            <a:fld id="{E32D28F8-53AE-4234-9393-E5F6E52213FC}" type="slidenum">
+              <a:rPr lang="en-CA" smtClean="0"/>
+              <a:t>6</a:t>
+            </a:fld>
+            <a:endParaRPr lang="en-CA"/>
+          </a:p>
+        </p:txBody>
+      </p:sp>
+      <p:pic>
+        <p:nvPicPr>
+          <p:cNvPr id="4" name="Picture 3">
+            <a:extLst>
+              <a:ext uri="{FF2B5EF4-FFF2-40B4-BE49-F238E27FC236}">
+                <a16:creationId xmlns:a16="http://schemas.microsoft.com/office/drawing/2014/main" id="{E08D15F0-6DD2-32E2-450B-DAA72C5F6C38}"/>
+              </a:ext>
+            </a:extLst>
+          </p:cNvPr>
+          <p:cNvPicPr>
+            <a:picLocks noChangeAspect="1"/>
+          </p:cNvPicPr>
+          <p:nvPr/>
+        </p:nvPicPr>
+        <p:blipFill>
+          <a:blip r:embed="rId4"/>
+          <a:stretch>
+            <a:fillRect/>
+          </a:stretch>
+        </p:blipFill>
+        <p:spPr>
+          <a:xfrm>
+            <a:off x="1127227" y="1484315"/>
+            <a:ext cx="6419565" cy="2305050"/>
+          </a:xfrm>
+          <a:prstGeom prst="rect">
+            <a:avLst/>
+          </a:prstGeom>
+        </p:spPr>
+      </p:pic>
+      <p:pic>
+        <p:nvPicPr>
+          <p:cNvPr id="9" name="Picture 8">
+            <a:extLst>
+              <a:ext uri="{FF2B5EF4-FFF2-40B4-BE49-F238E27FC236}">
+                <a16:creationId xmlns:a16="http://schemas.microsoft.com/office/drawing/2014/main" id="{D37670F0-8AF4-1330-7B4E-2D92F7CAF08D}"/>
+              </a:ext>
+            </a:extLst>
+          </p:cNvPr>
+          <p:cNvPicPr>
+            <a:picLocks noChangeAspect="1"/>
+          </p:cNvPicPr>
+          <p:nvPr/>
+        </p:nvPicPr>
+        <p:blipFill>
+          <a:blip r:embed="rId5"/>
+          <a:stretch>
+            <a:fillRect/>
+          </a:stretch>
+        </p:blipFill>
+        <p:spPr>
+          <a:xfrm>
+            <a:off x="1094734" y="4113415"/>
+            <a:ext cx="6425557" cy="2328101"/>
+          </a:xfrm>
+          <a:prstGeom prst="rect">
+            <a:avLst/>
+          </a:prstGeom>
+        </p:spPr>
+      </p:pic>
+    </p:spTree>
+    <p:extLst>
+      <p:ext uri="{BB962C8B-B14F-4D97-AF65-F5344CB8AC3E}">
+        <p14:creationId xmlns:p14="http://schemas.microsoft.com/office/powerpoint/2010/main" val="672229212"/>
+      </p:ext>
+    </p:extLst>
+  </p:cSld>
+  <p:clrMapOvr>
+    <a:masterClrMapping/>
+  </p:clrMapOvr>
+</p:sld>
+</file>
+
+<file path=ppt/slides/slide7.xml><?xml version="1.0" encoding="utf-8"?>
+<p:sld xmlns:a="http://schemas.openxmlformats.org/drawingml/2006/main" xmlns:r="http://schemas.openxmlformats.org/officeDocument/2006/relationships" xmlns:p="http://schemas.openxmlformats.org/presentationml/2006/main">
+  <p:cSld>
+    <p:spTree>
+      <p:nvGrpSpPr>
+        <p:cNvPr id="1" name=""/>
+        <p:cNvGrpSpPr/>
+        <p:nvPr/>
+      </p:nvGrpSpPr>
+      <p:grpSpPr>
+        <a:xfrm>
+          <a:off x="0" y="0"/>
+          <a:ext cx="0" cy="0"/>
+          <a:chOff x="0" y="0"/>
+          <a:chExt cx="0" cy="0"/>
+        </a:xfrm>
+      </p:grpSpPr>
+      <p:pic>
+        <p:nvPicPr>
+          <p:cNvPr id="8" name="Picture 7">
+            <a:extLst>
+              <a:ext uri="{FF2B5EF4-FFF2-40B4-BE49-F238E27FC236}">
+                <a16:creationId xmlns:a16="http://schemas.microsoft.com/office/drawing/2014/main" id="{A2993B62-66B1-9512-BA99-55E691565532}"/>
+              </a:ext>
+            </a:extLst>
+          </p:cNvPr>
+          <p:cNvPicPr>
+            <a:picLocks noChangeAspect="1"/>
+          </p:cNvPicPr>
+          <p:nvPr/>
+        </p:nvPicPr>
+        <p:blipFill>
+          <a:blip r:embed="rId2"/>
+          <a:stretch>
+            <a:fillRect/>
+          </a:stretch>
+        </p:blipFill>
+        <p:spPr>
+          <a:xfrm>
+            <a:off x="3337471" y="1333807"/>
+            <a:ext cx="5713236" cy="5524193"/>
+          </a:xfrm>
+          <a:prstGeom prst="rect">
+            <a:avLst/>
+          </a:prstGeom>
+        </p:spPr>
+      </p:pic>
+      <p:grpSp>
+        <p:nvGrpSpPr>
+          <p:cNvPr id="7" name="Group 6">
+            <a:extLst>
+              <a:ext uri="{FF2B5EF4-FFF2-40B4-BE49-F238E27FC236}">
+                <a16:creationId xmlns:a16="http://schemas.microsoft.com/office/drawing/2014/main" id="{2C394A6C-0273-16E3-5006-DEF757576BD4}"/>
+              </a:ext>
+            </a:extLst>
+          </p:cNvPr>
+          <p:cNvGrpSpPr/>
+          <p:nvPr/>
+        </p:nvGrpSpPr>
+        <p:grpSpPr>
+          <a:xfrm>
+            <a:off x="-52388" y="-42546"/>
+            <a:ext cx="9144004" cy="1345501"/>
+            <a:chOff x="0" y="-9525"/>
+            <a:chExt cx="9144004" cy="1345501"/>
+          </a:xfrm>
+        </p:grpSpPr>
+        <p:pic>
+          <p:nvPicPr>
+            <p:cNvPr id="5" name="Picture 4" descr="A group of glasses of beer next to a barrel&#10;&#10;Description automatically generated">
+              <a:extLst>
+                <a:ext uri="{FF2B5EF4-FFF2-40B4-BE49-F238E27FC236}">
+                  <a16:creationId xmlns:a16="http://schemas.microsoft.com/office/drawing/2014/main" id="{5FCCBEF3-084E-30BD-69A6-66F4082760DF}"/>
+                </a:ext>
+              </a:extLst>
+            </p:cNvPr>
+            <p:cNvPicPr>
+              <a:picLocks noChangeAspect="1"/>
+            </p:cNvPicPr>
+            <p:nvPr/>
+          </p:nvPicPr>
+          <p:blipFill rotWithShape="1">
+            <a:blip r:embed="rId3">
+              <a:extLst>
+                <a:ext uri="{28A0092B-C50C-407E-A947-70E740481C1C}">
+                  <a14:useLocalDpi xmlns:a14="http://schemas.microsoft.com/office/drawing/2010/main" val="0"/>
+                </a:ext>
+              </a:extLst>
+            </a:blip>
+            <a:srcRect l="86905" t="-1" r="-1" b="33333"/>
+            <a:stretch/>
+          </p:blipFill>
+          <p:spPr>
+            <a:xfrm rot="16200000">
+              <a:off x="1613250" y="-1622775"/>
+              <a:ext cx="1345501" cy="4572002"/>
+            </a:xfrm>
+            <a:prstGeom prst="rect">
+              <a:avLst/>
+            </a:prstGeom>
+          </p:spPr>
+        </p:pic>
+        <p:pic>
+          <p:nvPicPr>
+            <p:cNvPr id="6" name="Picture 5" descr="A group of glasses of beer next to a barrel&#10;&#10;Description automatically generated">
+              <a:extLst>
+                <a:ext uri="{FF2B5EF4-FFF2-40B4-BE49-F238E27FC236}">
+                  <a16:creationId xmlns:a16="http://schemas.microsoft.com/office/drawing/2014/main" id="{A235DD66-457F-CB85-4B74-7118A0FC8CED}"/>
+                </a:ext>
+              </a:extLst>
+            </p:cNvPr>
+            <p:cNvPicPr>
+              <a:picLocks noChangeAspect="1"/>
+            </p:cNvPicPr>
+            <p:nvPr/>
+          </p:nvPicPr>
+          <p:blipFill rotWithShape="1">
+            <a:blip r:embed="rId3">
+              <a:extLst>
+                <a:ext uri="{28A0092B-C50C-407E-A947-70E740481C1C}">
+                  <a14:useLocalDpi xmlns:a14="http://schemas.microsoft.com/office/drawing/2010/main" val="0"/>
+                </a:ext>
+              </a:extLst>
+            </a:blip>
+            <a:srcRect l="86905" t="-1" r="-1" b="33333"/>
+            <a:stretch/>
+          </p:blipFill>
+          <p:spPr>
+            <a:xfrm rot="16200000">
+              <a:off x="6185252" y="-1622775"/>
+              <a:ext cx="1345501" cy="4572002"/>
+            </a:xfrm>
+            <a:prstGeom prst="rect">
+              <a:avLst/>
+            </a:prstGeom>
+          </p:spPr>
+        </p:pic>
+      </p:grpSp>
+      <p:sp>
+        <p:nvSpPr>
+          <p:cNvPr id="2" name="Title 1">
+            <a:extLst>
+              <a:ext uri="{FF2B5EF4-FFF2-40B4-BE49-F238E27FC236}">
+                <a16:creationId xmlns:a16="http://schemas.microsoft.com/office/drawing/2014/main" id="{13EBFBAB-7D21-FC7F-0D14-3DF13D7305AF}"/>
+              </a:ext>
+            </a:extLst>
+          </p:cNvPr>
+          <p:cNvSpPr>
+            <a:spLocks noGrp="1"/>
+          </p:cNvSpPr>
+          <p:nvPr>
+            <p:ph type="title"/>
+          </p:nvPr>
+        </p:nvSpPr>
+        <p:spPr>
+          <a:xfrm>
             <a:off x="628650" y="360364"/>
             <a:ext cx="8462966" cy="754062"/>
           </a:xfrm>
@@ -6461,7 +7291,7 @@
           <a:p>
             <a:fld id="{E32D28F8-53AE-4234-9393-E5F6E52213FC}" type="slidenum">
               <a:rPr lang="en-CA" smtClean="0"/>
-              <a:t>5</a:t>
+              <a:t>7</a:t>
             </a:fld>
             <a:endParaRPr lang="en-CA" dirty="0"/>
           </a:p>
@@ -6515,7 +7345,7 @@
           <a:p>
             <a:r>
               <a:rPr lang="en-US" sz="1600" dirty="0"/>
-              <a:t>The database has 20 features and 10M rows (scaled down to 50k)</a:t>
+              <a:t>The database has 20 features and 10M rows (scaled down to 50k sample)</a:t>
             </a:r>
             <a:r>
               <a:rPr lang="en-US" sz="1600" baseline="30000" dirty="0"/>
@@ -6525,7 +7355,7 @@
           <a:p>
             <a:r>
               <a:rPr lang="en-US" sz="1600" dirty="0"/>
-              <a:t>Most features in the database are uniformly distributed – likely due to its synthetic nature</a:t>
+              <a:t>Most features in the database are uniformly distributed</a:t>
             </a:r>
             <a:endParaRPr lang="en-CA" sz="1600" dirty="0"/>
           </a:p>
@@ -6587,7 +7417,7 @@
 </p:sld>
 </file>
 
-<file path=ppt/slides/slide6.xml><?xml version="1.0" encoding="utf-8"?>
+<file path=ppt/slides/slide8.xml><?xml version="1.0" encoding="utf-8"?>
 <p:sld xmlns:a="http://schemas.openxmlformats.org/drawingml/2006/main" xmlns:r="http://schemas.openxmlformats.org/officeDocument/2006/relationships" xmlns:p="http://schemas.openxmlformats.org/presentationml/2006/main">
   <p:cSld>
     <p:spTree>
@@ -6757,7 +7587,7 @@
           <a:p>
             <a:fld id="{E32D28F8-53AE-4234-9393-E5F6E52213FC}" type="slidenum">
               <a:rPr lang="en-CA" smtClean="0"/>
-              <a:t>6</a:t>
+              <a:t>8</a:t>
             </a:fld>
             <a:endParaRPr lang="en-CA"/>
           </a:p>
@@ -6787,7 +7617,7 @@
         </p:spPr>
         <p:txBody>
           <a:bodyPr>
-            <a:normAutofit/>
+            <a:normAutofit lnSpcReduction="10000"/>
           </a:bodyPr>
           <a:lstStyle/>
           <a:p>
@@ -6823,8 +7653,23 @@
               </a:lnSpc>
             </a:pPr>
             <a:r>
+              <a:rPr lang="en-US" sz="1400" b="1" dirty="0">
+                <a:solidFill>
+                  <a:srgbClr val="C00000"/>
+                </a:solidFill>
+              </a:rPr>
+              <a:t>HOWEVER, IT APPEARS TO NOT PRODUCE ANY MEANINGFUL INSIGHTS DUE TO UNIFORM DESTRIBUTIONS FOR ALL PROVIDED FEATURES</a:t>
+            </a:r>
+          </a:p>
+          <a:p>
+            <a:pPr lvl="1">
+              <a:lnSpc>
+                <a:spcPct val="100000"/>
+              </a:lnSpc>
+            </a:pPr>
+            <a:r>
               <a:rPr lang="en-US" sz="1400" dirty="0"/>
-              <a:t>It looks like we need to perform </a:t>
+              <a:t>It looks like we would need to perform </a:t>
             </a:r>
             <a:r>
               <a:rPr lang="en-US" sz="1400" b="1" dirty="0"/>
@@ -6935,7 +7780,15 @@
             </a:pPr>
             <a:r>
               <a:rPr lang="en-US" sz="1600" dirty="0"/>
-              <a:t>Additionally, identified low correlation between independent variables and several instances of multicollinearity</a:t>
+              <a:t>Additionally, identified low correlation </a:t>
+            </a:r>
+            <a:r>
+              <a:rPr lang="en-US" sz="1600"/>
+              <a:t>between various </a:t>
+            </a:r>
+            <a:r>
+              <a:rPr lang="en-US" sz="1600" dirty="0"/>
+              <a:t>independent variables and several instances of multicollinearity</a:t>
             </a:r>
           </a:p>
           <a:p>

</xml_diff>